<commit_message>
New daily brief again. Added limit option for sports scores
</commit_message>
<xml_diff>
--- a/dailyBrief20170505.pptx
+++ b/dailyBrief20170505.pptx
@@ -3216,27 +3216,27 @@
           <a:lstStyle/>
           <a:p>
             <a:r>
+              <a:t>North Korea claims CIA plot to kill Kim Jong-un. State media accuse the US of plotting to assassinate Kim Jong-un with "biochemical substances".</a:t>
+            </a:r>
+          </a:p>
+          <a:p>
+            <a:r>
               <a:t>French election: Macron and Le Pen wrap up tense campaign. It is the final day of campaigning for Marine Le Pen and Emmanuel Macron ahead of Sunday's vote.</a:t>
             </a:r>
           </a:p>
           <a:p>
             <a:r>
+              <a:t>Brexit: English language 'losing importance' - EU's Juncker. The EU Commission chief delivers a speech in French because English "is losing importance in Europe".</a:t>
+            </a:r>
+          </a:p>
+          <a:p>
+            <a:r>
+              <a:t>Delta Air Lines kicks US family off flight after row over toddler. Parents say they were threatened with jail and children with foster care for refusing to get off.</a:t>
+            </a:r>
+          </a:p>
+          <a:p>
+            <a:r>
               <a:t>Obamacare is 'dead' says Trump after healthcare victory. The US president celebrates after the lower house narrowly passes the Republican healthcare bill.</a:t>
-            </a:r>
-          </a:p>
-          <a:p>
-            <a:r>
-              <a:t>Delta Air Lines kicks US family off flight after row over toddler. Parents say they were threatened with jail and children with foster care for refusing to get off.</a:t>
-            </a:r>
-          </a:p>
-          <a:p>
-            <a:r>
-              <a:t>Argentine climber rescued off Mt Logan after quake and avalanche. Natalia Martínez had been trapped by heavy snow and high winds on Canada's Mt Logan, her team say.</a:t>
-            </a:r>
-          </a:p>
-          <a:p>
-            <a:r>
-              <a:t>Woman who helps thirsty pigs evades jail. The Canadian animal rights activist says the decision confirms that "compassion is not a crime".</a:t>
             </a:r>
           </a:p>
         </p:txBody>
@@ -3376,6 +3376,12 @@
           <a:lstStyle/>
           <a:p>
             <a:r>
+              <a:t>Shooting in Richmond Co.</a:t>
+            </a:r>
+            <a:br/>
+          </a:p>
+          <a:p>
+            <a:r>
               <a:t>11th annual Undercover Artist fundraiser for Walton Foundation for Independence</a:t>
             </a:r>
             <a:br/>
@@ -3389,6 +3395,12 @@
           <a:p>
             <a:r>
               <a:t>Fun for the whole family at GA Renaissance Festival</a:t>
+            </a:r>
+            <a:br/>
+          </a:p>
+          <a:p>
+            <a:r>
+              <a:t>“Woofstock 2017” to benefit Aiken County Animal Shelter Saturday</a:t>
             </a:r>
             <a:br/>
           </a:p>
@@ -3449,17 +3461,27 @@
           <a:lstStyle/>
           <a:p>
             <a:r>
-              <a:t>(IDN-ISL) Ps Tni vs Persiba Balikpapan: 0-1 - 2nd Half Started</a:t>
-            </a:r>
-          </a:p>
-          <a:p>
-            <a:r>
-              <a:t>(ROU-LII) FC Balotesti vs Olimpia Satu Mare: 1-0 - 2nd Half Started</a:t>
-            </a:r>
-          </a:p>
-          <a:p>
-            <a:r>
-              <a:t>(MAS-PR) UiTM FC vs PDRM: 2-0 - Goal for UiTM FC</a:t>
+              <a:t>(MAS-PR) Perlis vs Kuala Lumpur FA: 0-5 - Goal for Kuala Lumpur FA</a:t>
+            </a:r>
+          </a:p>
+          <a:p>
+            <a:r>
+              <a:t>(AUS-VIC) Melbourne Knights FC vs North Geelong: 1-0 - Goal for Melbourne Knights FC</a:t>
+            </a:r>
+          </a:p>
+          <a:p>
+            <a:r>
+              <a:t>(MAS-PR) UiTM FC vs PDRM: 4-3 - Match Finished</a:t>
+            </a:r>
+          </a:p>
+          <a:p>
+            <a:r>
+              <a:t>(AUS-VIC) Pascoe Vale vs Oakleigh Cannons: 2-1 - Goal for Pascoe Vale</a:t>
+            </a:r>
+          </a:p>
+          <a:p>
+            <a:r>
+              <a:t>(AUS-VIC) Bentleigh Greens vs South Melbourne: 0-0 - Kick Off</a:t>
             </a:r>
           </a:p>
         </p:txBody>

</xml_diff>